<commit_message>
Cambios en Presentacion y Codigo
</commit_message>
<xml_diff>
--- a/presentation/Enumeraciones y arraylist.pptx
+++ b/presentation/Enumeraciones y arraylist.pptx
@@ -5808,7 +5808,7 @@
               </a:lnSpc>
             </a:pPr>
             <a:r>
-              <a:rPr lang="es-ES" sz="1600"/>
+              <a:rPr lang="es-ES" sz="1600" dirty="0"/>
               <a:t>Teniendo una clase Fecha podríamos definir un enum como día de la semana con las opciones validas.</a:t>
             </a:r>
           </a:p>
@@ -5819,16 +5819,8 @@
               </a:lnSpc>
             </a:pPr>
             <a:r>
-              <a:rPr lang="es-ES" sz="1600"/>
-              <a:t>Los enum pueden tener, atributos, métodos, </a:t>
-            </a:r>
-            <a:r>
-              <a:rPr lang="es-ES" sz="1600" err="1"/>
-              <a:t>contructores</a:t>
-            </a:r>
-            <a:r>
-              <a:rPr lang="es-ES" sz="1600"/>
-              <a:t>.</a:t>
+              <a:rPr lang="es-ES" sz="1600" dirty="0"/>
+              <a:t>Los enum pueden tener, atributos, métodos, constructores.</a:t>
             </a:r>
           </a:p>
           <a:p>
@@ -5838,23 +5830,15 @@
               </a:lnSpc>
             </a:pPr>
             <a:r>
-              <a:rPr lang="es-ES" sz="1600"/>
-              <a:t>Algunos </a:t>
-            </a:r>
-            <a:r>
-              <a:rPr lang="es-ES" sz="1600" err="1"/>
-              <a:t>metodos</a:t>
-            </a:r>
-            <a:r>
-              <a:rPr lang="es-ES" sz="1600"/>
-              <a:t> que podemos usar con los </a:t>
-            </a:r>
-            <a:r>
-              <a:rPr lang="es-ES" sz="1600" err="1"/>
+              <a:rPr lang="es-ES" sz="1600" dirty="0"/>
+              <a:t>Algunos métodos que podemos usar con los </a:t>
+            </a:r>
+            <a:r>
+              <a:rPr lang="es-ES" sz="1600" dirty="0" err="1"/>
               <a:t>enums</a:t>
             </a:r>
             <a:r>
-              <a:rPr lang="es-ES" sz="1600"/>
+              <a:rPr lang="es-ES" sz="1600" dirty="0"/>
               <a:t> son:</a:t>
             </a:r>
           </a:p>
@@ -5865,43 +5849,43 @@
               </a:lnSpc>
             </a:pPr>
             <a:r>
-              <a:rPr lang="es-ES" sz="1600"/>
+              <a:rPr lang="es-ES" sz="1600" dirty="0"/>
               <a:t>.</a:t>
             </a:r>
             <a:r>
-              <a:rPr lang="es-ES" sz="1600" err="1"/>
+              <a:rPr lang="es-ES" sz="1600" dirty="0" err="1"/>
               <a:t>values</a:t>
             </a:r>
             <a:r>
-              <a:rPr lang="es-ES" sz="1600"/>
+              <a:rPr lang="es-ES" sz="1600" dirty="0"/>
               <a:t>() //Devuelve todas la opciones del enum</a:t>
             </a:r>
             <a:br>
-              <a:rPr lang="es-ES" sz="1600"/>
+              <a:rPr lang="es-ES" sz="1600" dirty="0"/>
             </a:br>
             <a:r>
-              <a:rPr lang="es-ES" sz="1600"/>
+              <a:rPr lang="es-ES" sz="1600" dirty="0"/>
               <a:t>.</a:t>
             </a:r>
             <a:r>
-              <a:rPr lang="es-ES" sz="1600" err="1"/>
+              <a:rPr lang="es-ES" sz="1600" dirty="0" err="1"/>
               <a:t>valueOf</a:t>
             </a:r>
             <a:r>
-              <a:rPr lang="es-ES" sz="1600"/>
+              <a:rPr lang="es-ES" sz="1600" dirty="0"/>
               <a:t>() //Convierte una cadena a un valor enum</a:t>
             </a:r>
             <a:br>
-              <a:rPr lang="es-ES" sz="1600"/>
+              <a:rPr lang="es-ES" sz="1600" dirty="0"/>
             </a:br>
             <a:r>
-              <a:rPr lang="es-ES" sz="1600"/>
+              <a:rPr lang="es-ES" sz="1600" dirty="0"/>
               <a:t>.ordinal() //Devuelve el índice de un valor enum</a:t>
             </a:r>
             <a:br>
-              <a:rPr lang="es-ES" sz="1600"/>
+              <a:rPr lang="es-ES" sz="1600" dirty="0"/>
             </a:br>
-            <a:endParaRPr lang="es-ES" sz="1600"/>
+            <a:endParaRPr lang="es-ES" sz="1600" dirty="0"/>
           </a:p>
         </p:txBody>
       </p:sp>
@@ -5944,15 +5928,6 @@
           <a:solidFill>
             <a:srgbClr val="FFFFFF"/>
           </a:solidFill>
-          <a:extLst>
-            <a:ext uri="{909E8E84-426E-40DD-AFC4-6F175D3DCCD1}">
-              <a14:hiddenFill xmlns:a14="http://schemas.microsoft.com/office/drawing/2010/main">
-                <a:solidFill>
-                  <a:srgbClr val="FFFFFF"/>
-                </a:solidFill>
-              </a14:hiddenFill>
-            </a:ext>
-          </a:extLst>
         </p:spPr>
       </p:pic>
     </p:spTree>
@@ -6283,45 +6258,45 @@
           <a:lstStyle/>
           <a:p>
             <a:r>
-              <a:rPr lang="es-ES" sz="1900"/>
+              <a:rPr lang="es-ES" sz="1900" dirty="0"/>
               <a:t>El tipo de dato que almacena por defecto un </a:t>
             </a:r>
             <a:r>
-              <a:rPr lang="es-ES" sz="1900" err="1"/>
+              <a:rPr lang="es-ES" sz="1900" dirty="0" err="1"/>
               <a:t>ArrayList</a:t>
             </a:r>
             <a:r>
-              <a:rPr lang="es-ES" sz="1900"/>
+              <a:rPr lang="es-ES" sz="1900" dirty="0"/>
               <a:t> es tipo </a:t>
             </a:r>
             <a:r>
-              <a:rPr lang="es-ES" sz="1900" err="1"/>
+              <a:rPr lang="es-ES" sz="1900" dirty="0" err="1"/>
               <a:t>Object</a:t>
             </a:r>
             <a:r>
-              <a:rPr lang="es-ES" sz="1900"/>
+              <a:rPr lang="es-ES" sz="1900" dirty="0"/>
               <a:t>, pero podemos forzar un tipo de dato para acceder a las propiedades de este tipo de dato en el siguiente ejemplo realizaremos las acciones básicas de un </a:t>
             </a:r>
             <a:r>
-              <a:rPr lang="es-ES" sz="1900" err="1"/>
+              <a:rPr lang="es-ES" sz="1900" dirty="0" err="1"/>
               <a:t>ArrayList</a:t>
             </a:r>
             <a:r>
-              <a:rPr lang="es-ES" sz="1900"/>
+              <a:rPr lang="es-ES" sz="1900" dirty="0"/>
               <a:t> de tipo Persona.</a:t>
             </a:r>
           </a:p>
           <a:p>
             <a:r>
-              <a:rPr lang="es-ES" sz="1900"/>
+              <a:rPr lang="es-ES" sz="1900" dirty="0"/>
               <a:t>Si no definimos tipo podremos almacenar cualquier dato que se pueda castear como </a:t>
             </a:r>
             <a:r>
-              <a:rPr lang="es-ES" sz="1900" err="1"/>
+              <a:rPr lang="es-ES" sz="1900" dirty="0" err="1"/>
               <a:t>object</a:t>
             </a:r>
             <a:r>
-              <a:rPr lang="es-ES" sz="1900"/>
+              <a:rPr lang="es-ES" sz="1900" dirty="0"/>
               <a:t>.</a:t>
             </a:r>
           </a:p>
@@ -6366,15 +6341,6 @@
           <a:solidFill>
             <a:srgbClr val="FFFFFF"/>
           </a:solidFill>
-          <a:extLst>
-            <a:ext uri="{909E8E84-426E-40DD-AFC4-6F175D3DCCD1}">
-              <a14:hiddenFill xmlns:a14="http://schemas.microsoft.com/office/drawing/2010/main">
-                <a:solidFill>
-                  <a:srgbClr val="FFFFFF"/>
-                </a:solidFill>
-              </a14:hiddenFill>
-            </a:ext>
-          </a:extLst>
         </p:spPr>
       </p:pic>
     </p:spTree>
@@ -6471,7 +6437,7 @@
         </p:spPr>
         <p:txBody>
           <a:bodyPr>
-            <a:normAutofit/>
+            <a:normAutofit fontScale="92500" lnSpcReduction="10000"/>
           </a:bodyPr>
           <a:lstStyle/>
           <a:p>
@@ -6542,7 +6508,7 @@
             </a:r>
             <a:r>
               <a:rPr lang="es-ES" sz="1600" dirty="0"/>
-              <a:t>() //Eliminar un objeto del </a:t>
+              <a:t>(x) //Eliminar un objeto del </a:t>
             </a:r>
             <a:r>
               <a:rPr lang="es-ES" sz="1600" dirty="0" err="1"/>
@@ -6586,7 +6552,67 @@
               <a:rPr lang="es-ES" sz="1600" dirty="0" err="1"/>
               <a:t>arraylist</a:t>
             </a:r>
-            <a:endParaRPr lang="es-ES" sz="1600" dirty="0"/>
+            <a:br>
+              <a:rPr lang="es-ES" sz="1600" dirty="0"/>
+            </a:br>
+            <a:r>
+              <a:rPr lang="es-ES" sz="1600" dirty="0"/>
+              <a:t>.</a:t>
+            </a:r>
+            <a:r>
+              <a:rPr lang="es-ES" sz="1600" dirty="0" err="1"/>
+              <a:t>indexOf</a:t>
+            </a:r>
+            <a:r>
+              <a:rPr lang="es-ES" sz="1600" dirty="0"/>
+              <a:t>(</a:t>
+            </a:r>
+            <a:r>
+              <a:rPr lang="es-ES" sz="1600" dirty="0" err="1"/>
+              <a:t>param</a:t>
+            </a:r>
+            <a:r>
+              <a:rPr lang="es-ES" sz="1600" dirty="0"/>
+              <a:t>) //Busca un elemento y devuelve su posición.</a:t>
+            </a:r>
+            <a:br>
+              <a:rPr lang="es-ES" sz="1600" dirty="0"/>
+            </a:br>
+            <a:r>
+              <a:rPr lang="es-ES" sz="1600" dirty="0"/>
+              <a:t>.</a:t>
+            </a:r>
+            <a:r>
+              <a:rPr lang="es-ES" sz="1600" dirty="0" err="1"/>
+              <a:t>contains</a:t>
+            </a:r>
+            <a:r>
+              <a:rPr lang="es-ES" sz="1600" dirty="0"/>
+              <a:t>(</a:t>
+            </a:r>
+            <a:r>
+              <a:rPr lang="es-ES" sz="1600" dirty="0" err="1"/>
+              <a:t>obj</a:t>
+            </a:r>
+            <a:r>
+              <a:rPr lang="es-ES" sz="1600" dirty="0"/>
+              <a:t>) //Busca un objeto dentro del array y devuelve true o 		false si lo encontró.</a:t>
+            </a:r>
+            <a:br>
+              <a:rPr lang="es-ES" sz="1600" dirty="0"/>
+            </a:br>
+            <a:r>
+              <a:rPr lang="es-ES" sz="1600" dirty="0"/>
+              <a:t>.</a:t>
+            </a:r>
+            <a:r>
+              <a:rPr lang="es-ES" sz="1600" dirty="0" err="1"/>
+              <a:t>isEmpty</a:t>
+            </a:r>
+            <a:r>
+              <a:rPr lang="es-ES" sz="1600" dirty="0"/>
+              <a:t>() //Verifica si un array esta vacío </a:t>
+            </a:r>
           </a:p>
           <a:p>
             <a:pPr>
@@ -8049,23 +8075,6 @@
 </file>
 
 <file path=customXml/item1.xml><?xml version="1.0" encoding="utf-8"?>
-<p:properties xmlns:p="http://schemas.microsoft.com/office/2006/metadata/properties" xmlns:xsi="http://www.w3.org/2001/XMLSchema-instance" xmlns:pc="http://schemas.microsoft.com/office/infopath/2007/PartnerControls">
-  <documentManagement>
-    <MediaServiceKeyPoints xmlns="71af3243-3dd4-4a8d-8c0d-dd76da1f02a5" xsi:nil="true"/>
-  </documentManagement>
-</p:properties>
-</file>
-
-<file path=customXml/item2.xml><?xml version="1.0" encoding="utf-8"?>
-<?mso-contentType ?>
-<FormTemplates xmlns="http://schemas.microsoft.com/sharepoint/v3/contenttype/forms">
-  <Display>DocumentLibraryForm</Display>
-  <Edit>DocumentLibraryForm</Edit>
-  <New>DocumentLibraryForm</New>
-</FormTemplates>
-</file>
-
-<file path=customXml/item3.xml><?xml version="1.0" encoding="utf-8"?>
 <ct:contentTypeSchema xmlns:ct="http://schemas.microsoft.com/office/2006/metadata/contentType" xmlns:ma="http://schemas.microsoft.com/office/2006/metadata/properties/metaAttributes" ct:_="" ma:_="" ma:contentTypeName="Document" ma:contentTypeID="0x01010079F111ED35F8CC479449609E8A0923A6" ma:contentTypeVersion="11" ma:contentTypeDescription="Create a new document." ma:contentTypeScope="" ma:versionID="1c2eb7a32e66fb6e4260f3771546a5e2">
   <xsd:schema xmlns:xsd="http://www.w3.org/2001/XMLSchema" xmlns:xs="http://www.w3.org/2001/XMLSchema" xmlns:p="http://schemas.microsoft.com/office/2006/metadata/properties" xmlns:ns2="71af3243-3dd4-4a8d-8c0d-dd76da1f02a5" xmlns:ns3="16c05727-aa75-4e4a-9b5f-8a80a1165891" targetNamespace="http://schemas.microsoft.com/office/2006/metadata/properties" ma:root="true" ma:fieldsID="04e1f6479c48b08974ba73b5ca973489" ns2:_="" ns3:_="">
     <xsd:import namespace="71af3243-3dd4-4a8d-8c0d-dd76da1f02a5"/>
@@ -8276,25 +8285,24 @@
 </ct:contentTypeSchema>
 </file>
 
-<file path=customXml/itemProps1.xml><?xml version="1.0" encoding="utf-8"?>
-<ds:datastoreItem xmlns:ds="http://schemas.openxmlformats.org/officeDocument/2006/customXml" ds:itemID="{0DAABB37-1599-4AE8-818C-82E84CA93DF4}">
-  <ds:schemaRefs>
-    <ds:schemaRef ds:uri="http://schemas.microsoft.com/office/2006/metadata/properties"/>
-    <ds:schemaRef ds:uri="http://schemas.microsoft.com/office/infopath/2007/PartnerControls"/>
-    <ds:schemaRef ds:uri="71af3243-3dd4-4a8d-8c0d-dd76da1f02a5"/>
-  </ds:schemaRefs>
-</ds:datastoreItem>
+<file path=customXml/item2.xml><?xml version="1.0" encoding="utf-8"?>
+<?mso-contentType ?>
+<FormTemplates xmlns="http://schemas.microsoft.com/sharepoint/v3/contenttype/forms">
+  <Display>DocumentLibraryForm</Display>
+  <Edit>DocumentLibraryForm</Edit>
+  <New>DocumentLibraryForm</New>
+</FormTemplates>
 </file>
 
-<file path=customXml/itemProps2.xml><?xml version="1.0" encoding="utf-8"?>
-<ds:datastoreItem xmlns:ds="http://schemas.openxmlformats.org/officeDocument/2006/customXml" ds:itemID="{BCF9EC99-89FF-486C-9E02-31E13FD72E16}">
-  <ds:schemaRefs>
-    <ds:schemaRef ds:uri="http://schemas.microsoft.com/sharepoint/v3/contenttype/forms"/>
-  </ds:schemaRefs>
-</ds:datastoreItem>
+<file path=customXml/item3.xml><?xml version="1.0" encoding="utf-8"?>
+<p:properties xmlns:p="http://schemas.microsoft.com/office/2006/metadata/properties" xmlns:xsi="http://www.w3.org/2001/XMLSchema-instance" xmlns:pc="http://schemas.microsoft.com/office/infopath/2007/PartnerControls">
+  <documentManagement>
+    <MediaServiceKeyPoints xmlns="71af3243-3dd4-4a8d-8c0d-dd76da1f02a5" xsi:nil="true"/>
+  </documentManagement>
+</p:properties>
 </file>
 
-<file path=customXml/itemProps3.xml><?xml version="1.0" encoding="utf-8"?>
+<file path=customXml/itemProps1.xml><?xml version="1.0" encoding="utf-8"?>
 <ds:datastoreItem xmlns:ds="http://schemas.openxmlformats.org/officeDocument/2006/customXml" ds:itemID="{596CF9D2-F3E0-450F-B184-8D2A0EB8B18B}">
   <ds:schemaRefs>
     <ds:schemaRef ds:uri="http://schemas.microsoft.com/office/2006/metadata/contentType"/>
@@ -8311,4 +8319,22 @@
     <ds:schemaRef ds:uri="http://schemas.microsoft.com/internal/obd"/>
   </ds:schemaRefs>
 </ds:datastoreItem>
+</file>
+
+<file path=customXml/itemProps2.xml><?xml version="1.0" encoding="utf-8"?>
+<ds:datastoreItem xmlns:ds="http://schemas.openxmlformats.org/officeDocument/2006/customXml" ds:itemID="{BCF9EC99-89FF-486C-9E02-31E13FD72E16}">
+  <ds:schemaRefs>
+    <ds:schemaRef ds:uri="http://schemas.microsoft.com/sharepoint/v3/contenttype/forms"/>
+  </ds:schemaRefs>
+</ds:datastoreItem>
+</file>
+
+<file path=customXml/itemProps3.xml><?xml version="1.0" encoding="utf-8"?>
+<ds:datastoreItem xmlns:ds="http://schemas.openxmlformats.org/officeDocument/2006/customXml" ds:itemID="{0DAABB37-1599-4AE8-818C-82E84CA93DF4}">
+  <ds:schemaRefs>
+    <ds:schemaRef ds:uri="http://schemas.microsoft.com/office/2006/metadata/properties"/>
+    <ds:schemaRef ds:uri="http://schemas.microsoft.com/office/infopath/2007/PartnerControls"/>
+    <ds:schemaRef ds:uri="71af3243-3dd4-4a8d-8c0d-dd76da1f02a5"/>
+  </ds:schemaRefs>
+</ds:datastoreItem>
 </file>
</xml_diff>